<commit_message>
Habe noch ein Kommando zu Folie 5 hinzugefügt
</commit_message>
<xml_diff>
--- a/Github Überblick.pptx
+++ b/Github Überblick.pptx
@@ -109,14 +109,6 @@
     </a:lvl9pPr>
   </p:defaultTextStyle>
 </p:presentation>
-</file>
-
-<file path=ppt/revisionInfo.xml><?xml version="1.0" encoding="utf-8"?>
-<p1510:revInfo xmlns:a="http://schemas.openxmlformats.org/drawingml/2006/main" xmlns:r="http://schemas.openxmlformats.org/officeDocument/2006/relationships" xmlns:p1510="http://schemas.microsoft.com/office/powerpoint/2015/10/main">
-  <p1510:revLst>
-    <p1510:client id="{C883B71F-C8A4-4D16-B4D8-BBE0CF7BEB73}" v="13" dt="2023-02-07T20:46:01.505"/>
-  </p1510:revLst>
-</p1510:revInfo>
 </file>
 
 <file path=ppt/slideLayouts/slideLayout1.xml><?xml version="1.0" encoding="utf-8"?>
@@ -3905,6 +3897,12 @@
               <a:rPr lang="de-DE" sz="2000" dirty="0"/>
               <a:t>-Client mit grafischer Benutzeroberfläche. </a:t>
             </a:r>
+          </a:p>
+          <a:p>
+            <a:pPr indent="-228600">
+              <a:buFont typeface="Arial" panose="020B0604020202020204" pitchFamily="34" charset="0"/>
+              <a:buChar char="•"/>
+            </a:pPr>
             <a:endParaRPr lang="en-US" sz="2000" dirty="0"/>
           </a:p>
         </p:txBody>
@@ -4388,10 +4386,9 @@
               <a:buChar char="•"/>
             </a:pPr>
             <a:r>
-              <a:rPr lang="de-DE"/>
+              <a:rPr lang="de-DE" dirty="0"/>
               <a:t>Als gutes Vorgehen hat sich dabei etabliert, dass der Entwickler Kommentare hinzufügt, die dem Repository-Verantwortlichen schnell einen Überblick geben, was mit dem Pull Request erreicht werden soll.</a:t>
             </a:r>
-            <a:endParaRPr lang="de-DE" dirty="0"/>
           </a:p>
         </p:txBody>
       </p:sp>
@@ -4435,7 +4432,7 @@
       </p:grpSpPr>
       <p:sp useBgFill="1">
         <p:nvSpPr>
-          <p:cNvPr id="8" name="Rectangle 7">
+          <p:cNvPr id="17" name="Rectangle 16">
             <a:extLst>
               <a:ext uri="{FF2B5EF4-FFF2-40B4-BE49-F238E27FC236}">
                 <a16:creationId xmlns:a16="http://schemas.microsoft.com/office/drawing/2014/main" id="{C7FA33FF-088D-4F16-95A2-2C64D353DEA8}"/>
@@ -4524,7 +4521,7 @@
       </p:sp>
       <p:sp>
         <p:nvSpPr>
-          <p:cNvPr id="10" name="Rectangle 9">
+          <p:cNvPr id="19" name="Rectangle 18">
             <a:extLst>
               <a:ext uri="{FF2B5EF4-FFF2-40B4-BE49-F238E27FC236}">
                 <a16:creationId xmlns:a16="http://schemas.microsoft.com/office/drawing/2014/main" id="{A376EFB1-01CF-419F-ABF1-2AF02BBFCBD1}"/>
@@ -4618,7 +4615,7 @@
       </p:sp>
       <p:sp>
         <p:nvSpPr>
-          <p:cNvPr id="12" name="Freeform: Shape 11">
+          <p:cNvPr id="21" name="Freeform: Shape 20">
             <a:extLst>
               <a:ext uri="{FF2B5EF4-FFF2-40B4-BE49-F238E27FC236}">
                 <a16:creationId xmlns:a16="http://schemas.microsoft.com/office/drawing/2014/main" id="{FF9DEA15-78BD-4750-AA18-B9F28A6D5AB8}"/>
@@ -4823,63 +4820,90 @@
           <a:lstStyle/>
           <a:p>
             <a:r>
-              <a:rPr lang="de-DE" sz="2400" dirty="0" err="1"/>
+              <a:rPr lang="de-DE" sz="2000" dirty="0" err="1"/>
               <a:t>git</a:t>
             </a:r>
             <a:r>
-              <a:rPr lang="de-DE" sz="2400" dirty="0"/>
+              <a:rPr lang="de-DE" sz="2000" dirty="0"/>
               <a:t> </a:t>
             </a:r>
             <a:r>
-              <a:rPr lang="de-DE" sz="2400" dirty="0" err="1"/>
+              <a:rPr lang="de-DE" sz="2000" dirty="0" err="1"/>
               <a:t>init</a:t>
             </a:r>
             <a:r>
-              <a:rPr lang="de-DE" sz="2400" dirty="0"/>
+              <a:rPr lang="de-DE" sz="2000" dirty="0"/>
               <a:t>: Initialisieren eines lokalen </a:t>
             </a:r>
             <a:r>
-              <a:rPr lang="de-DE" sz="2400" dirty="0" err="1"/>
+              <a:rPr lang="de-DE" sz="2000" dirty="0" err="1"/>
               <a:t>Git</a:t>
             </a:r>
             <a:r>
-              <a:rPr lang="de-DE" sz="2400" dirty="0"/>
+              <a:rPr lang="de-DE" sz="2000" dirty="0"/>
               <a:t>-Projekts lokal. Kann man später auf GitHub hochladen.</a:t>
             </a:r>
           </a:p>
           <a:p>
             <a:r>
-              <a:rPr lang="de-DE" sz="2400" dirty="0" err="1"/>
+              <a:rPr lang="de-DE" sz="2000" dirty="0" err="1"/>
               <a:t>git</a:t>
             </a:r>
             <a:r>
-              <a:rPr lang="de-DE" sz="2400" dirty="0"/>
+              <a:rPr lang="de-DE" sz="2000" dirty="0"/>
               <a:t> </a:t>
             </a:r>
             <a:r>
-              <a:rPr lang="de-DE" sz="2400" dirty="0" err="1"/>
+              <a:rPr lang="de-DE" sz="2000" dirty="0" err="1"/>
               <a:t>add</a:t>
             </a:r>
             <a:r>
-              <a:rPr lang="de-DE" sz="2400" dirty="0"/>
+              <a:rPr lang="de-DE" sz="2000" dirty="0"/>
               <a:t>: Dateien zur Beobachtungsliste hinzufügen. Dieser Schritt ist zwingend erforderlich, um Ihre Arbeit anschließend auf das Repository zu laden.</a:t>
             </a:r>
           </a:p>
           <a:p>
             <a:r>
-              <a:rPr lang="de-DE" sz="2400" dirty="0" err="1"/>
+              <a:rPr lang="de-DE" sz="2000" dirty="0" err="1"/>
               <a:t>git</a:t>
             </a:r>
             <a:r>
-              <a:rPr lang="de-DE" sz="2400" dirty="0"/>
+              <a:rPr lang="de-DE" sz="2000" dirty="0"/>
+              <a:t> push: Mit einem Push senden Sie alle </a:t>
+            </a:r>
+            <a:r>
+              <a:rPr lang="de-DE" sz="2000" dirty="0" err="1"/>
+              <a:t>Commits</a:t>
+            </a:r>
+            <a:r>
+              <a:rPr lang="de-DE" sz="2000" dirty="0"/>
+              <a:t> an das entfernte Repository auf den Servern von </a:t>
+            </a:r>
+            <a:r>
+              <a:rPr lang="de-DE" sz="2000" dirty="0" err="1"/>
+              <a:t>Github</a:t>
+            </a:r>
+            <a:r>
+              <a:rPr lang="de-DE" sz="2000"/>
+              <a:t> oder dem gewählten anderen Anbieter.</a:t>
+            </a:r>
+            <a:endParaRPr lang="de-DE" sz="2000" dirty="0"/>
+          </a:p>
+          <a:p>
+            <a:r>
+              <a:rPr lang="de-DE" sz="2000" dirty="0" err="1"/>
+              <a:t>git</a:t>
+            </a:r>
+            <a:r>
+              <a:rPr lang="de-DE" sz="2000" dirty="0"/>
               <a:t> </a:t>
             </a:r>
             <a:r>
-              <a:rPr lang="de-DE" sz="2400" dirty="0" err="1"/>
+              <a:rPr lang="de-DE" sz="2000" dirty="0" err="1"/>
               <a:t>commit</a:t>
             </a:r>
             <a:r>
-              <a:rPr lang="de-DE" sz="2400" dirty="0"/>
+              <a:rPr lang="de-DE" sz="2000" dirty="0"/>
               <a:t>: Mit einem Commit hält man die Änderungen fest. Dies ist ein Stand, zu dem man jederzeit zurückgehen kann. Dateien müssen mit einem Commit gesichert werden, bevor sie an ein entferntes Repository gesendet werden können.</a:t>
             </a:r>
           </a:p>

</xml_diff>